<commit_message>
All presentations, updates from 17.9 * updated presentation 4
</commit_message>
<xml_diff>
--- a/Oemof_Workshop_04_Kickoff_Tuesday.pptx
+++ b/Oemof_Workshop_04_Kickoff_Tuesday.pptx
@@ -5,14 +5,13 @@
     <p:sldMasterId id="2147483660" r:id="rId1"/>
   </p:sldMasterIdLst>
   <p:notesMasterIdLst>
-    <p:notesMasterId r:id="rId7"/>
+    <p:notesMasterId r:id="rId6"/>
   </p:notesMasterIdLst>
   <p:sldIdLst>
     <p:sldId id="330" r:id="rId2"/>
     <p:sldId id="331" r:id="rId3"/>
-    <p:sldId id="328" r:id="rId4"/>
-    <p:sldId id="304" r:id="rId5"/>
-    <p:sldId id="302" r:id="rId6"/>
+    <p:sldId id="304" r:id="rId4"/>
+    <p:sldId id="302" r:id="rId5"/>
   </p:sldIdLst>
   <p:sldSz cx="9144000" cy="6858000" type="screen4x3"/>
   <p:notesSz cx="6858000" cy="9144000"/>
@@ -212,7 +211,7 @@
           <a:p>
             <a:fld id="{6BD11D3B-DADA-9042-8997-28ACE677BFD3}" type="datetimeFigureOut">
               <a:rPr lang="de-DE" smtClean="0"/>
-              <a:t>15.09.2019</a:t>
+              <a:t>17.09.2019</a:t>
             </a:fld>
             <a:endParaRPr lang="de-DE"/>
           </a:p>
@@ -752,8 +751,8 @@
           <a:lstStyle/>
           <a:p>
             <a:r>
-              <a:rPr lang="de-DE" dirty="0" smtClean="0"/>
-              <a:t>Call</a:t>
+              <a:rPr lang="de-DE" dirty="0" err="1" smtClean="0"/>
+              <a:t>Present</a:t>
             </a:r>
             <a:r>
               <a:rPr lang="de-DE" baseline="0" dirty="0" smtClean="0"/>
@@ -761,7 +760,7 @@
             </a:r>
             <a:r>
               <a:rPr lang="de-DE" baseline="0" dirty="0" err="1" smtClean="0"/>
-              <a:t>for</a:t>
+              <a:t>daily</a:t>
             </a:r>
             <a:r>
               <a:rPr lang="de-DE" baseline="0" dirty="0" smtClean="0"/>
@@ -769,7 +768,7 @@
             </a:r>
             <a:r>
               <a:rPr lang="de-DE" baseline="0" dirty="0" err="1" smtClean="0"/>
-              <a:t>attention</a:t>
+              <a:t>schedule</a:t>
             </a:r>
             <a:endParaRPr lang="de-DE" baseline="0" dirty="0" smtClean="0"/>
           </a:p>
@@ -793,110 +792,6 @@
             <a:fld id="{B1E58A51-5952-5047-839D-0803ED9D6A3D}" type="slidenum">
               <a:rPr lang="de-DE" smtClean="0"/>
               <a:t>2</a:t>
-            </a:fld>
-            <a:endParaRPr lang="de-DE"/>
-          </a:p>
-        </p:txBody>
-      </p:sp>
-    </p:spTree>
-    <p:extLst>
-      <p:ext uri="{BB962C8B-B14F-4D97-AF65-F5344CB8AC3E}">
-        <p14:creationId xmlns:p14="http://schemas.microsoft.com/office/powerpoint/2010/main" val="1838458626"/>
-      </p:ext>
-    </p:extLst>
-  </p:cSld>
-  <p:clrMapOvr>
-    <a:masterClrMapping/>
-  </p:clrMapOvr>
-</p:notes>
-</file>
-
-<file path=ppt/notesSlides/notesSlide4.xml><?xml version="1.0" encoding="utf-8"?>
-<p:notes xmlns:a="http://schemas.openxmlformats.org/drawingml/2006/main" xmlns:r="http://schemas.openxmlformats.org/officeDocument/2006/relationships" xmlns:p="http://schemas.openxmlformats.org/presentationml/2006/main">
-  <p:cSld>
-    <p:spTree>
-      <p:nvGrpSpPr>
-        <p:cNvPr id="1" name=""/>
-        <p:cNvGrpSpPr/>
-        <p:nvPr/>
-      </p:nvGrpSpPr>
-      <p:grpSpPr>
-        <a:xfrm>
-          <a:off x="0" y="0"/>
-          <a:ext cx="0" cy="0"/>
-          <a:chOff x="0" y="0"/>
-          <a:chExt cx="0" cy="0"/>
-        </a:xfrm>
-      </p:grpSpPr>
-      <p:sp>
-        <p:nvSpPr>
-          <p:cNvPr id="2" name="Folienbildplatzhalter 1"/>
-          <p:cNvSpPr>
-            <a:spLocks noGrp="1" noRot="1" noChangeAspect="1"/>
-          </p:cNvSpPr>
-          <p:nvPr>
-            <p:ph type="sldImg"/>
-          </p:nvPr>
-        </p:nvSpPr>
-        <p:spPr/>
-      </p:sp>
-      <p:sp>
-        <p:nvSpPr>
-          <p:cNvPr id="3" name="Notizenplatzhalter 2"/>
-          <p:cNvSpPr>
-            <a:spLocks noGrp="1"/>
-          </p:cNvSpPr>
-          <p:nvPr>
-            <p:ph type="body" idx="1"/>
-          </p:nvPr>
-        </p:nvSpPr>
-        <p:spPr/>
-        <p:txBody>
-          <a:bodyPr/>
-          <a:lstStyle/>
-          <a:p>
-            <a:r>
-              <a:rPr lang="de-DE" dirty="0" err="1" smtClean="0"/>
-              <a:t>Present</a:t>
-            </a:r>
-            <a:r>
-              <a:rPr lang="de-DE" baseline="0" dirty="0" smtClean="0"/>
-              <a:t> </a:t>
-            </a:r>
-            <a:r>
-              <a:rPr lang="de-DE" baseline="0" dirty="0" err="1" smtClean="0"/>
-              <a:t>daily</a:t>
-            </a:r>
-            <a:r>
-              <a:rPr lang="de-DE" baseline="0" dirty="0" smtClean="0"/>
-              <a:t> </a:t>
-            </a:r>
-            <a:r>
-              <a:rPr lang="de-DE" baseline="0" dirty="0" err="1" smtClean="0"/>
-              <a:t>schedule</a:t>
-            </a:r>
-            <a:endParaRPr lang="de-DE" baseline="0" dirty="0" smtClean="0"/>
-          </a:p>
-        </p:txBody>
-      </p:sp>
-      <p:sp>
-        <p:nvSpPr>
-          <p:cNvPr id="4" name="Foliennummernplatzhalter 3"/>
-          <p:cNvSpPr>
-            <a:spLocks noGrp="1"/>
-          </p:cNvSpPr>
-          <p:nvPr>
-            <p:ph type="sldNum" sz="quarter" idx="10"/>
-          </p:nvPr>
-        </p:nvSpPr>
-        <p:spPr/>
-        <p:txBody>
-          <a:bodyPr/>
-          <a:lstStyle/>
-          <a:p>
-            <a:fld id="{B1E58A51-5952-5047-839D-0803ED9D6A3D}" type="slidenum">
-              <a:rPr lang="de-DE" smtClean="0"/>
-              <a:t>3</a:t>
             </a:fld>
             <a:endParaRPr lang="de-DE"/>
           </a:p>
@@ -7197,7 +7092,7 @@
           <a:p>
             <a:r>
               <a:rPr lang="en-US" dirty="0" smtClean="0"/>
-              <a:t>September 16, 2019</a:t>
+              <a:t>September 17, 2019</a:t>
             </a:r>
             <a:endParaRPr lang="en-US" dirty="0"/>
           </a:p>
@@ -9885,7 +9780,7 @@
           <a:p>
             <a:r>
               <a:rPr lang="en-US" dirty="0" smtClean="0"/>
-              <a:t>September 16, 2019</a:t>
+              <a:t>September 17, 2019</a:t>
             </a:r>
             <a:endParaRPr lang="de-DE" dirty="0"/>
           </a:p>
@@ -10014,15 +9909,23 @@
               </a:spcAft>
             </a:pPr>
             <a:r>
-              <a:rPr lang="de-DE" sz="3200" b="1" dirty="0" smtClean="0">
+              <a:rPr lang="de-DE" sz="3200" dirty="0" err="1">
                 <a:latin typeface="Roboto Medium" panose="02000000000000000000" pitchFamily="2" charset="0"/>
                 <a:ea typeface="Roboto Medium" panose="02000000000000000000" pitchFamily="2" charset="0"/>
                 <a:cs typeface="Roboto Medium" panose="02000000000000000000" pitchFamily="2" charset="0"/>
               </a:rPr>
-              <a:t>Welcome </a:t>
-            </a:r>
-            <a:r>
-              <a:rPr lang="de-DE" sz="3200" b="1" dirty="0" err="1" smtClean="0">
+              <a:t>Getting</a:t>
+            </a:r>
+            <a:r>
+              <a:rPr lang="de-DE" sz="3200" dirty="0">
+                <a:latin typeface="Roboto Medium" panose="02000000000000000000" pitchFamily="2" charset="0"/>
+                <a:ea typeface="Roboto Medium" panose="02000000000000000000" pitchFamily="2" charset="0"/>
+                <a:cs typeface="Roboto Medium" panose="02000000000000000000" pitchFamily="2" charset="0"/>
+              </a:rPr>
+              <a:t> </a:t>
+            </a:r>
+            <a:r>
+              <a:rPr lang="de-DE" sz="3200" dirty="0" err="1">
                 <a:latin typeface="Roboto Medium" panose="02000000000000000000" pitchFamily="2" charset="0"/>
                 <a:ea typeface="Roboto Medium" panose="02000000000000000000" pitchFamily="2" charset="0"/>
                 <a:cs typeface="Roboto Medium" panose="02000000000000000000" pitchFamily="2" charset="0"/>
@@ -10030,7 +9933,7 @@
               <a:t>to</a:t>
             </a:r>
             <a:r>
-              <a:rPr lang="de-DE" sz="3200" b="1" dirty="0" smtClean="0">
+              <a:rPr lang="de-DE" sz="3200" dirty="0">
                 <a:latin typeface="Roboto Medium" panose="02000000000000000000" pitchFamily="2" charset="0"/>
                 <a:ea typeface="Roboto Medium" panose="02000000000000000000" pitchFamily="2" charset="0"/>
                 <a:cs typeface="Roboto Medium" panose="02000000000000000000" pitchFamily="2" charset="0"/>
@@ -10038,7 +9941,23 @@
               <a:t> </a:t>
             </a:r>
             <a:r>
-              <a:rPr lang="de-DE" sz="3200" b="1" dirty="0" err="1" smtClean="0">
+              <a:rPr lang="de-DE" sz="3200" dirty="0" err="1">
+                <a:latin typeface="Roboto Medium" panose="02000000000000000000" pitchFamily="2" charset="0"/>
+                <a:ea typeface="Roboto Medium" panose="02000000000000000000" pitchFamily="2" charset="0"/>
+                <a:cs typeface="Roboto Medium" panose="02000000000000000000" pitchFamily="2" charset="0"/>
+              </a:rPr>
+              <a:t>know</a:t>
+            </a:r>
+            <a:r>
+              <a:rPr lang="de-DE" sz="3200" dirty="0">
+                <a:latin typeface="Roboto Medium" panose="02000000000000000000" pitchFamily="2" charset="0"/>
+                <a:ea typeface="Roboto Medium" panose="02000000000000000000" pitchFamily="2" charset="0"/>
+                <a:cs typeface="Roboto Medium" panose="02000000000000000000" pitchFamily="2" charset="0"/>
+              </a:rPr>
+              <a:t> </a:t>
+            </a:r>
+            <a:r>
+              <a:rPr lang="de-DE" sz="3200" dirty="0" err="1">
                 <a:latin typeface="Roboto Medium" panose="02000000000000000000" pitchFamily="2" charset="0"/>
                 <a:ea typeface="Roboto Medium" panose="02000000000000000000" pitchFamily="2" charset="0"/>
                 <a:cs typeface="Roboto Medium" panose="02000000000000000000" pitchFamily="2" charset="0"/>
@@ -10046,14 +9965,86 @@
               <a:t>the</a:t>
             </a:r>
             <a:r>
-              <a:rPr lang="de-DE" sz="3200" b="1" dirty="0" smtClean="0">
+              <a:rPr lang="de-DE" sz="3200" dirty="0">
                 <a:latin typeface="Roboto Medium" panose="02000000000000000000" pitchFamily="2" charset="0"/>
                 <a:ea typeface="Roboto Medium" panose="02000000000000000000" pitchFamily="2" charset="0"/>
                 <a:cs typeface="Roboto Medium" panose="02000000000000000000" pitchFamily="2" charset="0"/>
               </a:rPr>
-              <a:t> RLI!</a:t>
-            </a:r>
-            <a:endParaRPr lang="de-DE" sz="3200" dirty="0" smtClean="0">
+              <a:t> </a:t>
+            </a:r>
+            <a:r>
+              <a:rPr lang="de-DE" sz="3200" dirty="0" err="1">
+                <a:latin typeface="Roboto Medium" panose="02000000000000000000" pitchFamily="2" charset="0"/>
+                <a:ea typeface="Roboto Medium" panose="02000000000000000000" pitchFamily="2" charset="0"/>
+                <a:cs typeface="Roboto Medium" panose="02000000000000000000" pitchFamily="2" charset="0"/>
+              </a:rPr>
+              <a:t>component</a:t>
+            </a:r>
+            <a:r>
+              <a:rPr lang="de-DE" sz="3200" dirty="0">
+                <a:latin typeface="Roboto Medium" panose="02000000000000000000" pitchFamily="2" charset="0"/>
+                <a:ea typeface="Roboto Medium" panose="02000000000000000000" pitchFamily="2" charset="0"/>
+                <a:cs typeface="Roboto Medium" panose="02000000000000000000" pitchFamily="2" charset="0"/>
+              </a:rPr>
+              <a:t> </a:t>
+            </a:r>
+            <a:r>
+              <a:rPr lang="de-DE" sz="3200" dirty="0" err="1">
+                <a:latin typeface="Roboto Medium" panose="02000000000000000000" pitchFamily="2" charset="0"/>
+                <a:ea typeface="Roboto Medium" panose="02000000000000000000" pitchFamily="2" charset="0"/>
+                <a:cs typeface="Roboto Medium" panose="02000000000000000000" pitchFamily="2" charset="0"/>
+              </a:rPr>
+              <a:t>models</a:t>
+            </a:r>
+            <a:r>
+              <a:rPr lang="de-DE" sz="3200" dirty="0">
+                <a:latin typeface="Roboto Medium" panose="02000000000000000000" pitchFamily="2" charset="0"/>
+                <a:ea typeface="Roboto Medium" panose="02000000000000000000" pitchFamily="2" charset="0"/>
+                <a:cs typeface="Roboto Medium" panose="02000000000000000000" pitchFamily="2" charset="0"/>
+              </a:rPr>
+              <a:t> </a:t>
+            </a:r>
+            <a:r>
+              <a:rPr lang="de-DE" sz="3200" dirty="0" err="1">
+                <a:latin typeface="Roboto Medium" panose="02000000000000000000" pitchFamily="2" charset="0"/>
+                <a:ea typeface="Roboto Medium" panose="02000000000000000000" pitchFamily="2" charset="0"/>
+                <a:cs typeface="Roboto Medium" panose="02000000000000000000" pitchFamily="2" charset="0"/>
+              </a:rPr>
+              <a:t>provided</a:t>
+            </a:r>
+            <a:r>
+              <a:rPr lang="de-DE" sz="3200" dirty="0">
+                <a:latin typeface="Roboto Medium" panose="02000000000000000000" pitchFamily="2" charset="0"/>
+                <a:ea typeface="Roboto Medium" panose="02000000000000000000" pitchFamily="2" charset="0"/>
+                <a:cs typeface="Roboto Medium" panose="02000000000000000000" pitchFamily="2" charset="0"/>
+              </a:rPr>
+              <a:t> </a:t>
+            </a:r>
+            <a:r>
+              <a:rPr lang="de-DE" sz="3200" dirty="0" err="1">
+                <a:latin typeface="Roboto Medium" panose="02000000000000000000" pitchFamily="2" charset="0"/>
+                <a:ea typeface="Roboto Medium" panose="02000000000000000000" pitchFamily="2" charset="0"/>
+                <a:cs typeface="Roboto Medium" panose="02000000000000000000" pitchFamily="2" charset="0"/>
+              </a:rPr>
+              <a:t>by</a:t>
+            </a:r>
+            <a:r>
+              <a:rPr lang="de-DE" sz="3200" dirty="0">
+                <a:latin typeface="Roboto Medium" panose="02000000000000000000" pitchFamily="2" charset="0"/>
+                <a:ea typeface="Roboto Medium" panose="02000000000000000000" pitchFamily="2" charset="0"/>
+                <a:cs typeface="Roboto Medium" panose="02000000000000000000" pitchFamily="2" charset="0"/>
+              </a:rPr>
+              <a:t> </a:t>
+            </a:r>
+            <a:r>
+              <a:rPr lang="de-DE" sz="3200" dirty="0" err="1">
+                <a:latin typeface="Roboto Medium" panose="02000000000000000000" pitchFamily="2" charset="0"/>
+                <a:ea typeface="Roboto Medium" panose="02000000000000000000" pitchFamily="2" charset="0"/>
+                <a:cs typeface="Roboto Medium" panose="02000000000000000000" pitchFamily="2" charset="0"/>
+              </a:rPr>
+              <a:t>oemof</a:t>
+            </a:r>
+            <a:endParaRPr lang="de-DE" sz="3200" dirty="0">
               <a:latin typeface="Roboto Medium" panose="02000000000000000000" pitchFamily="2" charset="0"/>
               <a:ea typeface="Roboto Medium" panose="02000000000000000000" pitchFamily="2" charset="0"/>
               <a:cs typeface="Roboto Medium" panose="02000000000000000000" pitchFamily="2" charset="0"/>
@@ -10150,337 +10141,6 @@
       </p:grpSpPr>
       <p:sp>
         <p:nvSpPr>
-          <p:cNvPr id="3" name="Datumsplatzhalter 2"/>
-          <p:cNvSpPr>
-            <a:spLocks noGrp="1"/>
-          </p:cNvSpPr>
-          <p:nvPr>
-            <p:ph type="dt" sz="half" idx="19"/>
-          </p:nvPr>
-        </p:nvSpPr>
-        <p:spPr>
-          <a:xfrm>
-            <a:off x="628650" y="6487210"/>
-            <a:ext cx="2057400" cy="365125"/>
-          </a:xfrm>
-        </p:spPr>
-        <p:txBody>
-          <a:bodyPr/>
-          <a:lstStyle/>
-          <a:p>
-            <a:r>
-              <a:rPr lang="en-US" dirty="0" smtClean="0"/>
-              <a:t>September 17, 2019</a:t>
-            </a:r>
-            <a:endParaRPr lang="de-DE" dirty="0"/>
-          </a:p>
-        </p:txBody>
-      </p:sp>
-      <p:sp>
-        <p:nvSpPr>
-          <p:cNvPr id="4" name="Foliennummernplatzhalter 3"/>
-          <p:cNvSpPr>
-            <a:spLocks noGrp="1"/>
-          </p:cNvSpPr>
-          <p:nvPr>
-            <p:ph type="sldNum" sz="quarter" idx="21"/>
-          </p:nvPr>
-        </p:nvSpPr>
-        <p:spPr>
-          <a:xfrm>
-            <a:off x="6457950" y="6487210"/>
-            <a:ext cx="2057400" cy="365125"/>
-          </a:xfrm>
-        </p:spPr>
-        <p:txBody>
-          <a:bodyPr/>
-          <a:lstStyle/>
-          <a:p>
-            <a:fld id="{C2A96E4E-EC3F-424D-8211-F17AF9FC0446}" type="slidenum">
-              <a:rPr lang="de-DE" smtClean="0"/>
-              <a:pPr/>
-              <a:t>2</a:t>
-            </a:fld>
-            <a:endParaRPr lang="de-DE" dirty="0"/>
-          </a:p>
-        </p:txBody>
-      </p:sp>
-      <p:sp>
-        <p:nvSpPr>
-          <p:cNvPr id="5" name="Fußzeilenplatzhalter 4"/>
-          <p:cNvSpPr>
-            <a:spLocks noGrp="1"/>
-          </p:cNvSpPr>
-          <p:nvPr>
-            <p:ph type="ftr" sz="quarter" idx="20"/>
-          </p:nvPr>
-        </p:nvSpPr>
-        <p:spPr>
-          <a:xfrm>
-            <a:off x="3028950" y="6487210"/>
-            <a:ext cx="3086100" cy="365125"/>
-          </a:xfrm>
-        </p:spPr>
-        <p:txBody>
-          <a:bodyPr/>
-          <a:lstStyle/>
-          <a:p>
-            <a:r>
-              <a:rPr lang="en-US" smtClean="0"/>
-              <a:t>Reiner Lemoine Institut</a:t>
-            </a:r>
-            <a:endParaRPr lang="de-DE" dirty="0"/>
-          </a:p>
-        </p:txBody>
-      </p:sp>
-      <p:sp>
-        <p:nvSpPr>
-          <p:cNvPr id="11" name="Titel 10"/>
-          <p:cNvSpPr>
-            <a:spLocks noGrp="1"/>
-          </p:cNvSpPr>
-          <p:nvPr>
-            <p:ph type="title"/>
-          </p:nvPr>
-        </p:nvSpPr>
-        <p:spPr/>
-        <p:txBody>
-          <a:bodyPr>
-            <a:normAutofit/>
-          </a:bodyPr>
-          <a:lstStyle/>
-          <a:p>
-            <a:r>
-              <a:rPr lang="de-DE" dirty="0" err="1" smtClean="0"/>
-              <a:t>Today‘s</a:t>
-            </a:r>
-            <a:r>
-              <a:rPr lang="de-DE" dirty="0" smtClean="0"/>
-              <a:t> </a:t>
-            </a:r>
-            <a:r>
-              <a:rPr lang="de-DE" dirty="0" err="1" smtClean="0"/>
-              <a:t>goal</a:t>
-            </a:r>
-            <a:endParaRPr lang="de-DE" dirty="0"/>
-          </a:p>
-        </p:txBody>
-      </p:sp>
-      <p:sp>
-        <p:nvSpPr>
-          <p:cNvPr id="2" name="Textplatzhalter 1"/>
-          <p:cNvSpPr>
-            <a:spLocks noGrp="1"/>
-          </p:cNvSpPr>
-          <p:nvPr>
-            <p:ph type="body" sz="quarter" idx="17"/>
-          </p:nvPr>
-        </p:nvSpPr>
-        <p:spPr>
-          <a:xfrm>
-            <a:off x="1470056" y="2531772"/>
-            <a:ext cx="6016594" cy="2069725"/>
-          </a:xfrm>
-          <a:solidFill>
-            <a:schemeClr val="bg1">
-              <a:lumMod val="95000"/>
-            </a:schemeClr>
-          </a:solidFill>
-        </p:spPr>
-        <p:txBody>
-          <a:bodyPr anchor="ctr">
-            <a:normAutofit/>
-          </a:bodyPr>
-          <a:lstStyle/>
-          <a:p>
-            <a:pPr algn="ctr">
-              <a:spcAft>
-                <a:spcPts val="600"/>
-              </a:spcAft>
-            </a:pPr>
-            <a:r>
-              <a:rPr lang="de-DE" sz="3200" dirty="0" err="1" smtClean="0">
-                <a:latin typeface="Roboto Medium" panose="02000000000000000000" pitchFamily="2" charset="0"/>
-                <a:ea typeface="Roboto Medium" panose="02000000000000000000" pitchFamily="2" charset="0"/>
-                <a:cs typeface="Roboto Medium" panose="02000000000000000000" pitchFamily="2" charset="0"/>
-              </a:rPr>
-              <a:t>Getting</a:t>
-            </a:r>
-            <a:r>
-              <a:rPr lang="de-DE" sz="3200" dirty="0" smtClean="0">
-                <a:latin typeface="Roboto Medium" panose="02000000000000000000" pitchFamily="2" charset="0"/>
-                <a:ea typeface="Roboto Medium" panose="02000000000000000000" pitchFamily="2" charset="0"/>
-                <a:cs typeface="Roboto Medium" panose="02000000000000000000" pitchFamily="2" charset="0"/>
-              </a:rPr>
-              <a:t> </a:t>
-            </a:r>
-            <a:r>
-              <a:rPr lang="de-DE" sz="3200" dirty="0" err="1" smtClean="0">
-                <a:latin typeface="Roboto Medium" panose="02000000000000000000" pitchFamily="2" charset="0"/>
-                <a:ea typeface="Roboto Medium" panose="02000000000000000000" pitchFamily="2" charset="0"/>
-                <a:cs typeface="Roboto Medium" panose="02000000000000000000" pitchFamily="2" charset="0"/>
-              </a:rPr>
-              <a:t>to</a:t>
-            </a:r>
-            <a:r>
-              <a:rPr lang="de-DE" sz="3200" dirty="0" smtClean="0">
-                <a:latin typeface="Roboto Medium" panose="02000000000000000000" pitchFamily="2" charset="0"/>
-                <a:ea typeface="Roboto Medium" panose="02000000000000000000" pitchFamily="2" charset="0"/>
-                <a:cs typeface="Roboto Medium" panose="02000000000000000000" pitchFamily="2" charset="0"/>
-              </a:rPr>
-              <a:t> </a:t>
-            </a:r>
-            <a:r>
-              <a:rPr lang="de-DE" sz="3200" dirty="0" err="1" smtClean="0">
-                <a:latin typeface="Roboto Medium" panose="02000000000000000000" pitchFamily="2" charset="0"/>
-                <a:ea typeface="Roboto Medium" panose="02000000000000000000" pitchFamily="2" charset="0"/>
-                <a:cs typeface="Roboto Medium" panose="02000000000000000000" pitchFamily="2" charset="0"/>
-              </a:rPr>
-              <a:t>know</a:t>
-            </a:r>
-            <a:r>
-              <a:rPr lang="de-DE" sz="3200" dirty="0" smtClean="0">
-                <a:latin typeface="Roboto Medium" panose="02000000000000000000" pitchFamily="2" charset="0"/>
-                <a:ea typeface="Roboto Medium" panose="02000000000000000000" pitchFamily="2" charset="0"/>
-                <a:cs typeface="Roboto Medium" panose="02000000000000000000" pitchFamily="2" charset="0"/>
-              </a:rPr>
-              <a:t> </a:t>
-            </a:r>
-            <a:r>
-              <a:rPr lang="de-DE" sz="3200" dirty="0" err="1" smtClean="0">
-                <a:latin typeface="Roboto Medium" panose="02000000000000000000" pitchFamily="2" charset="0"/>
-                <a:ea typeface="Roboto Medium" panose="02000000000000000000" pitchFamily="2" charset="0"/>
-                <a:cs typeface="Roboto Medium" panose="02000000000000000000" pitchFamily="2" charset="0"/>
-              </a:rPr>
-              <a:t>the</a:t>
-            </a:r>
-            <a:r>
-              <a:rPr lang="de-DE" sz="3200" dirty="0" smtClean="0">
-                <a:latin typeface="Roboto Medium" panose="02000000000000000000" pitchFamily="2" charset="0"/>
-                <a:ea typeface="Roboto Medium" panose="02000000000000000000" pitchFamily="2" charset="0"/>
-                <a:cs typeface="Roboto Medium" panose="02000000000000000000" pitchFamily="2" charset="0"/>
-              </a:rPr>
-              <a:t> </a:t>
-            </a:r>
-            <a:r>
-              <a:rPr lang="de-DE" sz="3200" dirty="0" err="1" smtClean="0">
-                <a:latin typeface="Roboto Medium" panose="02000000000000000000" pitchFamily="2" charset="0"/>
-                <a:ea typeface="Roboto Medium" panose="02000000000000000000" pitchFamily="2" charset="0"/>
-                <a:cs typeface="Roboto Medium" panose="02000000000000000000" pitchFamily="2" charset="0"/>
-              </a:rPr>
-              <a:t>component</a:t>
-            </a:r>
-            <a:r>
-              <a:rPr lang="de-DE" sz="3200" dirty="0" smtClean="0">
-                <a:latin typeface="Roboto Medium" panose="02000000000000000000" pitchFamily="2" charset="0"/>
-                <a:ea typeface="Roboto Medium" panose="02000000000000000000" pitchFamily="2" charset="0"/>
-                <a:cs typeface="Roboto Medium" panose="02000000000000000000" pitchFamily="2" charset="0"/>
-              </a:rPr>
-              <a:t> </a:t>
-            </a:r>
-            <a:r>
-              <a:rPr lang="de-DE" sz="3200" dirty="0" err="1" smtClean="0">
-                <a:latin typeface="Roboto Medium" panose="02000000000000000000" pitchFamily="2" charset="0"/>
-                <a:ea typeface="Roboto Medium" panose="02000000000000000000" pitchFamily="2" charset="0"/>
-                <a:cs typeface="Roboto Medium" panose="02000000000000000000" pitchFamily="2" charset="0"/>
-              </a:rPr>
-              <a:t>models</a:t>
-            </a:r>
-            <a:r>
-              <a:rPr lang="de-DE" sz="3200" dirty="0" smtClean="0">
-                <a:latin typeface="Roboto Medium" panose="02000000000000000000" pitchFamily="2" charset="0"/>
-                <a:ea typeface="Roboto Medium" panose="02000000000000000000" pitchFamily="2" charset="0"/>
-                <a:cs typeface="Roboto Medium" panose="02000000000000000000" pitchFamily="2" charset="0"/>
-              </a:rPr>
-              <a:t> </a:t>
-            </a:r>
-            <a:r>
-              <a:rPr lang="de-DE" sz="3200" dirty="0" err="1" smtClean="0">
-                <a:latin typeface="Roboto Medium" panose="02000000000000000000" pitchFamily="2" charset="0"/>
-                <a:ea typeface="Roboto Medium" panose="02000000000000000000" pitchFamily="2" charset="0"/>
-                <a:cs typeface="Roboto Medium" panose="02000000000000000000" pitchFamily="2" charset="0"/>
-              </a:rPr>
-              <a:t>provided</a:t>
-            </a:r>
-            <a:r>
-              <a:rPr lang="de-DE" sz="3200" dirty="0" smtClean="0">
-                <a:latin typeface="Roboto Medium" panose="02000000000000000000" pitchFamily="2" charset="0"/>
-                <a:ea typeface="Roboto Medium" panose="02000000000000000000" pitchFamily="2" charset="0"/>
-                <a:cs typeface="Roboto Medium" panose="02000000000000000000" pitchFamily="2" charset="0"/>
-              </a:rPr>
-              <a:t> </a:t>
-            </a:r>
-            <a:r>
-              <a:rPr lang="de-DE" sz="3200" dirty="0" err="1" smtClean="0">
-                <a:latin typeface="Roboto Medium" panose="02000000000000000000" pitchFamily="2" charset="0"/>
-                <a:ea typeface="Roboto Medium" panose="02000000000000000000" pitchFamily="2" charset="0"/>
-                <a:cs typeface="Roboto Medium" panose="02000000000000000000" pitchFamily="2" charset="0"/>
-              </a:rPr>
-              <a:t>by</a:t>
-            </a:r>
-            <a:r>
-              <a:rPr lang="de-DE" sz="3200" dirty="0" smtClean="0">
-                <a:latin typeface="Roboto Medium" panose="02000000000000000000" pitchFamily="2" charset="0"/>
-                <a:ea typeface="Roboto Medium" panose="02000000000000000000" pitchFamily="2" charset="0"/>
-                <a:cs typeface="Roboto Medium" panose="02000000000000000000" pitchFamily="2" charset="0"/>
-              </a:rPr>
-              <a:t> </a:t>
-            </a:r>
-            <a:r>
-              <a:rPr lang="de-DE" sz="3200" dirty="0" err="1" smtClean="0">
-                <a:latin typeface="Roboto Medium" panose="02000000000000000000" pitchFamily="2" charset="0"/>
-                <a:ea typeface="Roboto Medium" panose="02000000000000000000" pitchFamily="2" charset="0"/>
-                <a:cs typeface="Roboto Medium" panose="02000000000000000000" pitchFamily="2" charset="0"/>
-              </a:rPr>
-              <a:t>oemof</a:t>
-            </a:r>
-            <a:endParaRPr lang="de-DE" sz="3200" dirty="0" smtClean="0">
-              <a:latin typeface="Roboto Medium" panose="02000000000000000000" pitchFamily="2" charset="0"/>
-              <a:ea typeface="Roboto Medium" panose="02000000000000000000" pitchFamily="2" charset="0"/>
-              <a:cs typeface="Roboto Medium" panose="02000000000000000000" pitchFamily="2" charset="0"/>
-            </a:endParaRPr>
-          </a:p>
-        </p:txBody>
-      </p:sp>
-    </p:spTree>
-    <p:extLst>
-      <p:ext uri="{BB962C8B-B14F-4D97-AF65-F5344CB8AC3E}">
-        <p14:creationId xmlns:p14="http://schemas.microsoft.com/office/powerpoint/2010/main" val="2937124568"/>
-      </p:ext>
-    </p:extLst>
-  </p:cSld>
-  <p:clrMapOvr>
-    <a:masterClrMapping/>
-  </p:clrMapOvr>
-  <p:timing>
-    <p:tnLst>
-      <p:par>
-        <p:cTn id="1" dur="indefinite" restart="never" nodeType="tmRoot"/>
-      </p:par>
-    </p:tnLst>
-  </p:timing>
-</p:sld>
-</file>
-
-<file path=ppt/slides/slide4.xml><?xml version="1.0" encoding="utf-8"?>
-<p:sld xmlns:a="http://schemas.openxmlformats.org/drawingml/2006/main" xmlns:r="http://schemas.openxmlformats.org/officeDocument/2006/relationships" xmlns:p="http://schemas.openxmlformats.org/presentationml/2006/main">
-  <p:cSld>
-    <p:spTree>
-      <p:nvGrpSpPr>
-        <p:cNvPr id="1" name=""/>
-        <p:cNvGrpSpPr/>
-        <p:nvPr/>
-      </p:nvGrpSpPr>
-      <p:grpSpPr>
-        <a:xfrm>
-          <a:off x="0" y="0"/>
-          <a:ext cx="0" cy="0"/>
-          <a:chOff x="0" y="0"/>
-          <a:chExt cx="0" cy="0"/>
-        </a:xfrm>
-      </p:grpSpPr>
-      <p:sp>
-        <p:nvSpPr>
           <p:cNvPr id="2" name="Titel 1"/>
           <p:cNvSpPr>
             <a:spLocks noGrp="1"/>
@@ -10529,7 +10189,7 @@
             <a:fld id="{C2A96E4E-EC3F-424D-8211-F17AF9FC0446}" type="slidenum">
               <a:rPr lang="de-DE" smtClean="0"/>
               <a:pPr/>
-              <a:t>3</a:t>
+              <a:t>2</a:t>
             </a:fld>
             <a:endParaRPr lang="de-DE" dirty="0"/>
           </a:p>
@@ -12122,7 +11782,7 @@
 </p:sld>
 </file>
 
-<file path=ppt/slides/slide5.xml><?xml version="1.0" encoding="utf-8"?>
+<file path=ppt/slides/slide4.xml><?xml version="1.0" encoding="utf-8"?>
 <p:sld xmlns:a="http://schemas.openxmlformats.org/drawingml/2006/main" xmlns:r="http://schemas.openxmlformats.org/officeDocument/2006/relationships" xmlns:p="http://schemas.openxmlformats.org/presentationml/2006/main">
   <p:cSld>
     <p:spTree>
@@ -12192,7 +11852,7 @@
                 </a:solidFill>
               </a:rPr>
               <a:pPr/>
-              <a:t>4</a:t>
+              <a:t>3</a:t>
             </a:fld>
             <a:endParaRPr lang="de-DE" dirty="0">
               <a:solidFill>

</xml_diff>